<commit_message>
Updates to Obsidian Search Engine Phase Overview Plans
A few keywords have been updated in the powerpoint slides for structured and unstructured data search engines.
</commit_message>
<xml_diff>
--- a/Obsidian_Structured_Data_Search_Engine/Obsidian_SDSE_Plan_Phase_01.pptx
+++ b/Obsidian_Structured_Data_Search_Engine/Obsidian_SDSE_Plan_Phase_01.pptx
@@ -255,7 +255,7 @@
             <a:fld id="{ADD072A5-80F2-459C-8EED-9DCE35A75F4A}" type="datetimeFigureOut">
               <a:rPr lang="en-GB" smtClean="0"/>
               <a:pPr/>
-              <a:t>30/08/2020</a:t>
+              <a:t>09/10/2020</a:t>
             </a:fld>
             <a:endParaRPr lang="en-GB"/>
           </a:p>
@@ -427,7 +427,7 @@
             <a:fld id="{ADD072A5-80F2-459C-8EED-9DCE35A75F4A}" type="datetimeFigureOut">
               <a:rPr lang="en-GB" smtClean="0"/>
               <a:pPr/>
-              <a:t>30/08/2020</a:t>
+              <a:t>09/10/2020</a:t>
             </a:fld>
             <a:endParaRPr lang="en-GB"/>
           </a:p>
@@ -609,7 +609,7 @@
             <a:fld id="{ADD072A5-80F2-459C-8EED-9DCE35A75F4A}" type="datetimeFigureOut">
               <a:rPr lang="en-GB" smtClean="0"/>
               <a:pPr/>
-              <a:t>30/08/2020</a:t>
+              <a:t>09/10/2020</a:t>
             </a:fld>
             <a:endParaRPr lang="en-GB"/>
           </a:p>
@@ -781,7 +781,7 @@
             <a:fld id="{ADD072A5-80F2-459C-8EED-9DCE35A75F4A}" type="datetimeFigureOut">
               <a:rPr lang="en-GB" smtClean="0"/>
               <a:pPr/>
-              <a:t>30/08/2020</a:t>
+              <a:t>09/10/2020</a:t>
             </a:fld>
             <a:endParaRPr lang="en-GB"/>
           </a:p>
@@ -1029,7 +1029,7 @@
             <a:fld id="{ADD072A5-80F2-459C-8EED-9DCE35A75F4A}" type="datetimeFigureOut">
               <a:rPr lang="en-GB" smtClean="0"/>
               <a:pPr/>
-              <a:t>30/08/2020</a:t>
+              <a:t>09/10/2020</a:t>
             </a:fld>
             <a:endParaRPr lang="en-GB"/>
           </a:p>
@@ -1263,7 +1263,7 @@
             <a:fld id="{ADD072A5-80F2-459C-8EED-9DCE35A75F4A}" type="datetimeFigureOut">
               <a:rPr lang="en-GB" smtClean="0"/>
               <a:pPr/>
-              <a:t>30/08/2020</a:t>
+              <a:t>09/10/2020</a:t>
             </a:fld>
             <a:endParaRPr lang="en-GB"/>
           </a:p>
@@ -1632,7 +1632,7 @@
             <a:fld id="{ADD072A5-80F2-459C-8EED-9DCE35A75F4A}" type="datetimeFigureOut">
               <a:rPr lang="en-GB" smtClean="0"/>
               <a:pPr/>
-              <a:t>30/08/2020</a:t>
+              <a:t>09/10/2020</a:t>
             </a:fld>
             <a:endParaRPr lang="en-GB"/>
           </a:p>
@@ -1752,7 +1752,7 @@
             <a:fld id="{ADD072A5-80F2-459C-8EED-9DCE35A75F4A}" type="datetimeFigureOut">
               <a:rPr lang="en-GB" smtClean="0"/>
               <a:pPr/>
-              <a:t>30/08/2020</a:t>
+              <a:t>09/10/2020</a:t>
             </a:fld>
             <a:endParaRPr lang="en-GB"/>
           </a:p>
@@ -1849,7 +1849,7 @@
             <a:fld id="{ADD072A5-80F2-459C-8EED-9DCE35A75F4A}" type="datetimeFigureOut">
               <a:rPr lang="en-GB" smtClean="0"/>
               <a:pPr/>
-              <a:t>30/08/2020</a:t>
+              <a:t>09/10/2020</a:t>
             </a:fld>
             <a:endParaRPr lang="en-GB"/>
           </a:p>
@@ -2128,7 +2128,7 @@
             <a:fld id="{ADD072A5-80F2-459C-8EED-9DCE35A75F4A}" type="datetimeFigureOut">
               <a:rPr lang="en-GB" smtClean="0"/>
               <a:pPr/>
-              <a:t>30/08/2020</a:t>
+              <a:t>09/10/2020</a:t>
             </a:fld>
             <a:endParaRPr lang="en-GB"/>
           </a:p>
@@ -2383,7 +2383,7 @@
             <a:fld id="{ADD072A5-80F2-459C-8EED-9DCE35A75F4A}" type="datetimeFigureOut">
               <a:rPr lang="en-GB" smtClean="0"/>
               <a:pPr/>
-              <a:t>30/08/2020</a:t>
+              <a:t>09/10/2020</a:t>
             </a:fld>
             <a:endParaRPr lang="en-GB"/>
           </a:p>
@@ -2598,7 +2598,7 @@
             <a:fld id="{ADD072A5-80F2-459C-8EED-9DCE35A75F4A}" type="datetimeFigureOut">
               <a:rPr lang="en-GB" smtClean="0"/>
               <a:pPr/>
-              <a:t>30/08/2020</a:t>
+              <a:t>09/10/2020</a:t>
             </a:fld>
             <a:endParaRPr lang="en-GB"/>
           </a:p>
@@ -3277,7 +3277,11 @@
             <a:pPr algn="ctr"/>
             <a:r>
               <a:rPr lang="en-GB" dirty="0" smtClean="0"/>
-              <a:t>Causal Regressions</a:t>
+              <a:t>Causal </a:t>
+            </a:r>
+            <a:r>
+              <a:rPr lang="en-GB" dirty="0" smtClean="0"/>
+              <a:t>Methods</a:t>
             </a:r>
             <a:endParaRPr lang="en-GB" dirty="0"/>
           </a:p>

</xml_diff>